<commit_message>
minor tweaks to ppt
</commit_message>
<xml_diff>
--- a/Introduction to R Workshop 1.pptx
+++ b/Introduction to R Workshop 1.pptx
@@ -1521,7 +1521,7 @@
           <a:p>
             <a:fld id="{34DAE4EE-2DF8-45FB-8651-0A1C8E883882}" type="datetimeFigureOut">
               <a:rPr lang="en-NZ" smtClean="0"/>
-              <a:t>28/04/2025</a:t>
+              <a:t>12/05/2025</a:t>
             </a:fld>
             <a:endParaRPr lang="en-NZ"/>
           </a:p>
@@ -1721,7 +1721,7 @@
           <a:p>
             <a:fld id="{34DAE4EE-2DF8-45FB-8651-0A1C8E883882}" type="datetimeFigureOut">
               <a:rPr lang="en-NZ" smtClean="0"/>
-              <a:t>28/04/2025</a:t>
+              <a:t>12/05/2025</a:t>
             </a:fld>
             <a:endParaRPr lang="en-NZ"/>
           </a:p>
@@ -1931,7 +1931,7 @@
           <a:p>
             <a:fld id="{34DAE4EE-2DF8-45FB-8651-0A1C8E883882}" type="datetimeFigureOut">
               <a:rPr lang="en-NZ" smtClean="0"/>
-              <a:t>28/04/2025</a:t>
+              <a:t>12/05/2025</a:t>
             </a:fld>
             <a:endParaRPr lang="en-NZ"/>
           </a:p>
@@ -2131,7 +2131,7 @@
           <a:p>
             <a:fld id="{34DAE4EE-2DF8-45FB-8651-0A1C8E883882}" type="datetimeFigureOut">
               <a:rPr lang="en-NZ" smtClean="0"/>
-              <a:t>28/04/2025</a:t>
+              <a:t>12/05/2025</a:t>
             </a:fld>
             <a:endParaRPr lang="en-NZ"/>
           </a:p>
@@ -2407,7 +2407,7 @@
           <a:p>
             <a:fld id="{34DAE4EE-2DF8-45FB-8651-0A1C8E883882}" type="datetimeFigureOut">
               <a:rPr lang="en-NZ" smtClean="0"/>
-              <a:t>28/04/2025</a:t>
+              <a:t>12/05/2025</a:t>
             </a:fld>
             <a:endParaRPr lang="en-NZ"/>
           </a:p>
@@ -2675,7 +2675,7 @@
           <a:p>
             <a:fld id="{34DAE4EE-2DF8-45FB-8651-0A1C8E883882}" type="datetimeFigureOut">
               <a:rPr lang="en-NZ" smtClean="0"/>
-              <a:t>28/04/2025</a:t>
+              <a:t>12/05/2025</a:t>
             </a:fld>
             <a:endParaRPr lang="en-NZ"/>
           </a:p>
@@ -3090,7 +3090,7 @@
           <a:p>
             <a:fld id="{34DAE4EE-2DF8-45FB-8651-0A1C8E883882}" type="datetimeFigureOut">
               <a:rPr lang="en-NZ" smtClean="0"/>
-              <a:t>28/04/2025</a:t>
+              <a:t>12/05/2025</a:t>
             </a:fld>
             <a:endParaRPr lang="en-NZ"/>
           </a:p>
@@ -3232,7 +3232,7 @@
           <a:p>
             <a:fld id="{34DAE4EE-2DF8-45FB-8651-0A1C8E883882}" type="datetimeFigureOut">
               <a:rPr lang="en-NZ" smtClean="0"/>
-              <a:t>28/04/2025</a:t>
+              <a:t>12/05/2025</a:t>
             </a:fld>
             <a:endParaRPr lang="en-NZ"/>
           </a:p>
@@ -3345,7 +3345,7 @@
           <a:p>
             <a:fld id="{34DAE4EE-2DF8-45FB-8651-0A1C8E883882}" type="datetimeFigureOut">
               <a:rPr lang="en-NZ" smtClean="0"/>
-              <a:t>28/04/2025</a:t>
+              <a:t>12/05/2025</a:t>
             </a:fld>
             <a:endParaRPr lang="en-NZ"/>
           </a:p>
@@ -3658,7 +3658,7 @@
           <a:p>
             <a:fld id="{34DAE4EE-2DF8-45FB-8651-0A1C8E883882}" type="datetimeFigureOut">
               <a:rPr lang="en-NZ" smtClean="0"/>
-              <a:t>28/04/2025</a:t>
+              <a:t>12/05/2025</a:t>
             </a:fld>
             <a:endParaRPr lang="en-NZ"/>
           </a:p>
@@ -3947,7 +3947,7 @@
           <a:p>
             <a:fld id="{34DAE4EE-2DF8-45FB-8651-0A1C8E883882}" type="datetimeFigureOut">
               <a:rPr lang="en-NZ" smtClean="0"/>
-              <a:t>28/04/2025</a:t>
+              <a:t>12/05/2025</a:t>
             </a:fld>
             <a:endParaRPr lang="en-NZ"/>
           </a:p>
@@ -4190,7 +4190,7 @@
           <a:p>
             <a:fld id="{34DAE4EE-2DF8-45FB-8651-0A1C8E883882}" type="datetimeFigureOut">
               <a:rPr lang="en-NZ" smtClean="0"/>
-              <a:t>28/04/2025</a:t>
+              <a:t>12/05/2025</a:t>
             </a:fld>
             <a:endParaRPr lang="en-NZ"/>
           </a:p>
@@ -6493,14 +6493,14 @@
           <p:nvPr>
             <p:extLst>
               <p:ext uri="{D42A27DB-BD31-4B8C-83A1-F6EECF244321}">
-                <p14:modId xmlns:p14="http://schemas.microsoft.com/office/powerpoint/2010/main" val="3770805718"/>
+                <p14:modId xmlns:p14="http://schemas.microsoft.com/office/powerpoint/2010/main" val="3729160858"/>
               </p:ext>
             </p:extLst>
           </p:nvPr>
         </p:nvGraphicFramePr>
         <p:xfrm>
-          <a:off x="253678" y="1367632"/>
-          <a:ext cx="11549204" cy="4942840"/>
+          <a:off x="235390" y="2117440"/>
+          <a:ext cx="11549204" cy="3754120"/>
         </p:xfrm>
         <a:graphic>
           <a:graphicData uri="http://schemas.openxmlformats.org/drawingml/2006/table">
@@ -6537,7 +6537,7 @@
                     <a:bodyPr/>
                     <a:lstStyle/>
                     <a:p>
-                      <a:endParaRPr lang="en-NZ" b="0">
+                      <a:endParaRPr lang="en-NZ" b="0" dirty="0">
                         <a:solidFill>
                           <a:schemeClr val="tx1"/>
                         </a:solidFill>
@@ -6675,8 +6675,8 @@
                   </a:txBody>
                   <a:tcPr>
                     <a:solidFill>
-                      <a:schemeClr val="bg2">
-                        <a:lumMod val="75000"/>
+                      <a:schemeClr val="bg1">
+                        <a:lumMod val="95000"/>
                       </a:schemeClr>
                     </a:solidFill>
                   </a:tcPr>
@@ -6753,8 +6753,8 @@
                   </a:txBody>
                   <a:tcPr>
                     <a:solidFill>
-                      <a:schemeClr val="bg2">
-                        <a:lumMod val="75000"/>
+                      <a:schemeClr val="bg1">
+                        <a:lumMod val="95000"/>
                       </a:schemeClr>
                     </a:solidFill>
                   </a:tcPr>
@@ -6824,42 +6824,11 @@
                         <a:t> &lt;- read.csv(‘./data/buoy_data.csv’)</a:t>
                       </a:r>
                     </a:p>
-                    <a:p>
-                      <a:pPr marL="0" marR="0" lvl="0" indent="0" algn="l" defTabSz="914400" rtl="0" eaLnBrk="1" fontAlgn="auto" latinLnBrk="0" hangingPunct="1">
-                        <a:lnSpc>
-                          <a:spcPct val="100000"/>
-                        </a:lnSpc>
-                        <a:spcBef>
-                          <a:spcPts val="0"/>
-                        </a:spcBef>
-                        <a:spcAft>
-                          <a:spcPts val="0"/>
-                        </a:spcAft>
-                        <a:buClrTx/>
-                        <a:buSzTx/>
-                        <a:buFontTx/>
-                        <a:buNone/>
-                        <a:tabLst/>
-                        <a:defRPr/>
-                      </a:pPr>
-                      <a:r>
-                        <a:rPr lang="en-NZ" dirty="0" err="1">
-                          <a:solidFill>
-                            <a:schemeClr val="accent1"/>
-                          </a:solidFill>
-                        </a:rPr>
-                        <a:t>ctd_rotoehu</a:t>
-                      </a:r>
-                      <a:r>
-                        <a:rPr lang="en-NZ" dirty="0"/>
-                        <a:t> &lt;- read.csv(‘./data/ctd_data.csv’)</a:t>
-                      </a:r>
-                    </a:p>
                   </a:txBody>
                   <a:tcPr>
                     <a:solidFill>
-                      <a:schemeClr val="bg2">
-                        <a:lumMod val="75000"/>
+                      <a:schemeClr val="bg1">
+                        <a:lumMod val="95000"/>
                       </a:schemeClr>
                     </a:solidFill>
                   </a:tcPr>
@@ -6882,42 +6851,11 @@
                         <a:t> &lt;- read.csv(‘./data/buoy_data.csv’)</a:t>
                       </a:r>
                     </a:p>
-                    <a:p>
-                      <a:pPr marL="0" marR="0" lvl="0" indent="0" algn="l" defTabSz="914400" rtl="0" eaLnBrk="1" fontAlgn="auto" latinLnBrk="0" hangingPunct="1">
-                        <a:lnSpc>
-                          <a:spcPct val="100000"/>
-                        </a:lnSpc>
-                        <a:spcBef>
-                          <a:spcPts val="0"/>
-                        </a:spcBef>
-                        <a:spcAft>
-                          <a:spcPts val="0"/>
-                        </a:spcAft>
-                        <a:buClrTx/>
-                        <a:buSzTx/>
-                        <a:buFontTx/>
-                        <a:buNone/>
-                        <a:tabLst/>
-                        <a:defRPr/>
-                      </a:pPr>
-                      <a:r>
-                        <a:rPr lang="en-NZ" dirty="0" err="1">
-                          <a:solidFill>
-                            <a:schemeClr val="accent1"/>
-                          </a:solidFill>
-                        </a:rPr>
-                        <a:t>ctd_rotoehu</a:t>
-                      </a:r>
-                      <a:r>
-                        <a:rPr lang="en-NZ" dirty="0"/>
-                        <a:t> &lt;- read.csv(‘./data/ctd_data.csv’)</a:t>
-                      </a:r>
-                    </a:p>
                   </a:txBody>
                   <a:tcPr>
                     <a:solidFill>
-                      <a:schemeClr val="bg2">
-                        <a:lumMod val="75000"/>
+                      <a:schemeClr val="bg1">
+                        <a:lumMod val="95000"/>
                       </a:schemeClr>
                     </a:solidFill>
                   </a:tcPr>
@@ -6989,8 +6927,8 @@
                   </a:txBody>
                   <a:tcPr>
                     <a:solidFill>
-                      <a:schemeClr val="bg2">
-                        <a:lumMod val="75000"/>
+                      <a:schemeClr val="bg1">
+                        <a:lumMod val="95000"/>
                       </a:schemeClr>
                     </a:solidFill>
                   </a:tcPr>
@@ -7044,8 +6982,8 @@
                   </a:txBody>
                   <a:tcPr>
                     <a:solidFill>
-                      <a:schemeClr val="bg2">
-                        <a:lumMod val="75000"/>
+                      <a:schemeClr val="bg1">
+                        <a:lumMod val="95000"/>
                       </a:schemeClr>
                     </a:solidFill>
                   </a:tcPr>
@@ -7117,8 +7055,8 @@
                   </a:txBody>
                   <a:tcPr>
                     <a:solidFill>
-                      <a:schemeClr val="bg2">
-                        <a:lumMod val="75000"/>
+                      <a:schemeClr val="bg1">
+                        <a:lumMod val="95000"/>
                       </a:schemeClr>
                     </a:solidFill>
                   </a:tcPr>
@@ -7164,8 +7102,8 @@
                   </a:txBody>
                   <a:tcPr>
                     <a:solidFill>
-                      <a:schemeClr val="bg2">
-                        <a:lumMod val="75000"/>
+                      <a:schemeClr val="bg1">
+                        <a:lumMod val="95000"/>
                       </a:schemeClr>
                     </a:solidFill>
                   </a:tcPr>
@@ -7173,173 +7111,6 @@
                 <a:extLst>
                   <a:ext uri="{0D108BD9-81ED-4DB2-BD59-A6C34878D82A}">
                     <a16:rowId xmlns:a16="http://schemas.microsoft.com/office/drawing/2014/main" val="3969969203"/>
-                  </a:ext>
-                </a:extLst>
-              </a:tr>
-              <a:tr h="370840">
-                <a:tc>
-                  <a:txBody>
-                    <a:bodyPr/>
-                    <a:lstStyle/>
-                    <a:p>
-                      <a:r>
-                        <a:rPr lang="en-US" dirty="0"/>
-                        <a:t>Don’t name something the same as a function</a:t>
-                      </a:r>
-                      <a:endParaRPr lang="en-NZ" dirty="0"/>
-                    </a:p>
-                  </a:txBody>
-                  <a:tcPr>
-                    <a:solidFill>
-                      <a:schemeClr val="bg2">
-                        <a:lumMod val="75000"/>
-                      </a:schemeClr>
-                    </a:solidFill>
-                  </a:tcPr>
-                </a:tc>
-                <a:tc>
-                  <a:txBody>
-                    <a:bodyPr/>
-                    <a:lstStyle/>
-                    <a:p>
-                      <a:r>
-                        <a:rPr lang="en-US" dirty="0" err="1">
-                          <a:solidFill>
-                            <a:schemeClr val="accent1"/>
-                          </a:solidFill>
-                        </a:rPr>
-                        <a:t>thermo_depth</a:t>
-                      </a:r>
-                      <a:r>
-                        <a:rPr lang="en-US" dirty="0">
-                          <a:solidFill>
-                            <a:schemeClr val="accent1"/>
-                          </a:solidFill>
-                        </a:rPr>
-                        <a:t> </a:t>
-                      </a:r>
-                      <a:r>
-                        <a:rPr lang="en-US" dirty="0"/>
-                        <a:t>&lt;- </a:t>
-                      </a:r>
-                      <a:r>
-                        <a:rPr lang="en-US" dirty="0" err="1"/>
-                        <a:t>thermo.depth</a:t>
-                      </a:r>
-                      <a:r>
-                        <a:rPr lang="en-US" dirty="0"/>
-                        <a:t>(</a:t>
-                      </a:r>
-                      <a:r>
-                        <a:rPr lang="en-US" dirty="0" err="1"/>
-                        <a:t>data$temp</a:t>
-                      </a:r>
-                      <a:r>
-                        <a:rPr lang="en-US" dirty="0"/>
-                        <a:t>, </a:t>
-                      </a:r>
-                      <a:r>
-                        <a:rPr lang="en-US" dirty="0" err="1"/>
-                        <a:t>data$depth</a:t>
-                      </a:r>
-                      <a:r>
-                        <a:rPr lang="en-US" dirty="0"/>
-                        <a:t>)</a:t>
-                      </a:r>
-                      <a:endParaRPr lang="en-NZ" dirty="0"/>
-                    </a:p>
-                  </a:txBody>
-                  <a:tcPr>
-                    <a:solidFill>
-                      <a:schemeClr val="bg2">
-                        <a:lumMod val="75000"/>
-                      </a:schemeClr>
-                    </a:solidFill>
-                  </a:tcPr>
-                </a:tc>
-                <a:tc>
-                  <a:txBody>
-                    <a:bodyPr/>
-                    <a:lstStyle/>
-                    <a:p>
-                      <a:pPr marL="0" marR="0" lvl="0" indent="0" algn="l" defTabSz="914400" rtl="0" eaLnBrk="1" fontAlgn="auto" latinLnBrk="0" hangingPunct="1">
-                        <a:lnSpc>
-                          <a:spcPct val="100000"/>
-                        </a:lnSpc>
-                        <a:spcBef>
-                          <a:spcPts val="0"/>
-                        </a:spcBef>
-                        <a:spcAft>
-                          <a:spcPts val="0"/>
-                        </a:spcAft>
-                        <a:buClrTx/>
-                        <a:buSzTx/>
-                        <a:buFontTx/>
-                        <a:buNone/>
-                        <a:tabLst/>
-                        <a:defRPr/>
-                      </a:pPr>
-                      <a:r>
-                        <a:rPr lang="en-US" dirty="0" err="1">
-                          <a:solidFill>
-                            <a:schemeClr val="accent1"/>
-                          </a:solidFill>
-                        </a:rPr>
-                        <a:t>thermo.depth</a:t>
-                      </a:r>
-                      <a:r>
-                        <a:rPr lang="en-US" dirty="0">
-                          <a:solidFill>
-                            <a:schemeClr val="accent1"/>
-                          </a:solidFill>
-                        </a:rPr>
-                        <a:t> </a:t>
-                      </a:r>
-                      <a:r>
-                        <a:rPr lang="en-US" dirty="0"/>
-                        <a:t>&lt;- </a:t>
-                      </a:r>
-                      <a:r>
-                        <a:rPr lang="en-US" dirty="0" err="1"/>
-                        <a:t>thermo.depth</a:t>
-                      </a:r>
-                      <a:r>
-                        <a:rPr lang="en-US" dirty="0"/>
-                        <a:t>(</a:t>
-                      </a:r>
-                      <a:r>
-                        <a:rPr lang="en-US" dirty="0" err="1"/>
-                        <a:t>data$temp</a:t>
-                      </a:r>
-                      <a:r>
-                        <a:rPr lang="en-US" dirty="0"/>
-                        <a:t>, </a:t>
-                      </a:r>
-                      <a:r>
-                        <a:rPr lang="en-US" dirty="0" err="1"/>
-                        <a:t>data$depth</a:t>
-                      </a:r>
-                      <a:r>
-                        <a:rPr lang="en-US" dirty="0"/>
-                        <a:t>)</a:t>
-                      </a:r>
-                      <a:endParaRPr lang="en-NZ" dirty="0"/>
-                    </a:p>
-                    <a:p>
-                      <a:endParaRPr lang="en-NZ" dirty="0"/>
-                    </a:p>
-                  </a:txBody>
-                  <a:tcPr>
-                    <a:solidFill>
-                      <a:schemeClr val="bg2">
-                        <a:lumMod val="75000"/>
-                      </a:schemeClr>
-                    </a:solidFill>
-                  </a:tcPr>
-                </a:tc>
-                <a:extLst>
-                  <a:ext uri="{0D108BD9-81ED-4DB2-BD59-A6C34878D82A}">
-                    <a16:rowId xmlns:a16="http://schemas.microsoft.com/office/drawing/2014/main" val="2655674162"/>
                   </a:ext>
                 </a:extLst>
               </a:tr>
@@ -7424,7 +7195,7 @@
         <p:spPr/>
         <p:txBody>
           <a:bodyPr>
-            <a:normAutofit/>
+            <a:normAutofit lnSpcReduction="10000"/>
           </a:bodyPr>
           <a:lstStyle/>
           <a:p>
@@ -7455,7 +7226,7 @@
             <a:pPr lvl="1"/>
             <a:r>
               <a:rPr lang="en-NZ" dirty="0"/>
-              <a:t>Install some packages</a:t>
+              <a:t>Install and use packages</a:t>
             </a:r>
           </a:p>
           <a:p>
@@ -7484,15 +7255,27 @@
             <a:pPr lvl="1"/>
             <a:r>
               <a:rPr lang="en-NZ" dirty="0"/>
-              <a:t>Use base R functions</a:t>
+              <a:t>Understand data classes</a:t>
             </a:r>
           </a:p>
           <a:p>
             <a:pPr lvl="1"/>
             <a:r>
               <a:rPr lang="en-NZ" dirty="0"/>
-              <a:t>Access help documentation for functions</a:t>
-            </a:r>
+              <a:t>Use base R functions to subset and calculate summary statistics</a:t>
+            </a:r>
+          </a:p>
+          <a:p>
+            <a:pPr lvl="1"/>
+            <a:r>
+              <a:rPr lang="en-NZ" dirty="0"/>
+              <a:t>Plot data using </a:t>
+            </a:r>
+            <a:r>
+              <a:rPr lang="en-NZ" dirty="0" err="1"/>
+              <a:t>ggplot</a:t>
+            </a:r>
+            <a:endParaRPr lang="en-NZ" dirty="0"/>
           </a:p>
         </p:txBody>
       </p:sp>
@@ -8453,8 +8236,8 @@
           <a:lstStyle/>
           <a:p>
             <a:r>
-              <a:rPr lang="en-NZ"/>
-              <a:t>Let’s go to a working example</a:t>
+              <a:rPr lang="en-NZ" dirty="0"/>
+              <a:t>Let’s go to try some code!</a:t>
             </a:r>
           </a:p>
         </p:txBody>

</xml_diff>